<commit_message>
Rettet lidt på slides (mine egne :p)
</commit_message>
<xml_diff>
--- a/Afleveringer/Eksamen/Data Distributed System.pptx
+++ b/Afleveringer/Eksamen/Data Distributed System.pptx
@@ -13,11 +13,11 @@
     <p:sldId id="274" r:id="rId4"/>
     <p:sldId id="261" r:id="rId5"/>
     <p:sldId id="275" r:id="rId6"/>
-    <p:sldId id="280" r:id="rId7"/>
-    <p:sldId id="276" r:id="rId8"/>
-    <p:sldId id="277" r:id="rId9"/>
-    <p:sldId id="278" r:id="rId10"/>
-    <p:sldId id="262" r:id="rId11"/>
+    <p:sldId id="262" r:id="rId7"/>
+    <p:sldId id="280" r:id="rId8"/>
+    <p:sldId id="276" r:id="rId9"/>
+    <p:sldId id="277" r:id="rId10"/>
+    <p:sldId id="278" r:id="rId11"/>
     <p:sldId id="279" r:id="rId12"/>
     <p:sldId id="263" r:id="rId13"/>
     <p:sldId id="282" r:id="rId14"/>
@@ -207,7 +207,7 @@
             <a:fld id="{2F982AAE-B938-4249-BAB5-25214BF85327}" type="datetimeFigureOut">
               <a:rPr lang="da-DK" smtClean="0"/>
               <a:pPr/>
-              <a:t>28-05-2013</a:t>
+              <a:t>29/05/13</a:t>
             </a:fld>
             <a:endParaRPr lang="da-DK"/>
           </a:p>
@@ -376,6 +376,11 @@
         </p:txBody>
       </p:sp>
     </p:spTree>
+    <p:extLst>
+      <p:ext uri="{BB962C8B-B14F-4D97-AF65-F5344CB8AC3E}">
+        <p14:creationId xmlns:p14="http://schemas.microsoft.com/office/powerpoint/2010/main" val="1767798295"/>
+      </p:ext>
+    </p:extLst>
   </p:cSld>
   <p:clrMap bg1="lt1" tx1="dk1" bg2="lt2" tx2="dk2" accent1="accent1" accent2="accent2" accent3="accent3" accent4="accent4" accent5="accent5" accent6="accent6" hlink="hlink" folHlink="folHlink"/>
   <p:notesStyle>
@@ -607,7 +612,7 @@
           <a:p>
             <a:r>
               <a:rPr lang="da-DK" dirty="0" smtClean="0"/>
-              <a:t>Lasse</a:t>
+              <a:t>Rasmus</a:t>
             </a:r>
             <a:endParaRPr lang="da-DK" dirty="0"/>
           </a:p>
@@ -1467,7 +1472,7 @@
           <a:p>
             <a:r>
               <a:rPr lang="da-DK" dirty="0" smtClean="0"/>
-              <a:t>Mia</a:t>
+              <a:t>Lasse</a:t>
             </a:r>
             <a:endParaRPr lang="da-DK" dirty="0"/>
           </a:p>
@@ -1639,7 +1644,7 @@
           <a:p>
             <a:r>
               <a:rPr lang="da-DK" dirty="0" smtClean="0"/>
-              <a:t>Rasmus</a:t>
+              <a:t>Mia</a:t>
             </a:r>
             <a:endParaRPr lang="da-DK" dirty="0"/>
           </a:p>
@@ -2070,7 +2075,7 @@
             <a:fld id="{F95D7CF2-08BE-4584-88A3-02DBA3238833}" type="datetimeFigureOut">
               <a:rPr lang="da-DK" smtClean="0"/>
               <a:pPr/>
-              <a:t>28-05-2013</a:t>
+              <a:t>29/05/13</a:t>
             </a:fld>
             <a:endParaRPr lang="da-DK"/>
           </a:p>
@@ -2257,7 +2262,7 @@
             <a:fld id="{F95D7CF2-08BE-4584-88A3-02DBA3238833}" type="datetimeFigureOut">
               <a:rPr lang="da-DK" smtClean="0"/>
               <a:pPr/>
-              <a:t>28-05-2013</a:t>
+              <a:t>29/05/13</a:t>
             </a:fld>
             <a:endParaRPr lang="da-DK"/>
           </a:p>
@@ -2444,7 +2449,7 @@
             <a:fld id="{F95D7CF2-08BE-4584-88A3-02DBA3238833}" type="datetimeFigureOut">
               <a:rPr lang="da-DK" smtClean="0"/>
               <a:pPr/>
-              <a:t>28-05-2013</a:t>
+              <a:t>29/05/13</a:t>
             </a:fld>
             <a:endParaRPr lang="da-DK"/>
           </a:p>
@@ -2631,7 +2636,7 @@
             <a:fld id="{F95D7CF2-08BE-4584-88A3-02DBA3238833}" type="datetimeFigureOut">
               <a:rPr lang="da-DK" smtClean="0"/>
               <a:pPr/>
-              <a:t>28-05-2013</a:t>
+              <a:t>29/05/13</a:t>
             </a:fld>
             <a:endParaRPr lang="da-DK"/>
           </a:p>
@@ -3014,7 +3019,7 @@
             <a:fld id="{F95D7CF2-08BE-4584-88A3-02DBA3238833}" type="datetimeFigureOut">
               <a:rPr lang="da-DK" smtClean="0"/>
               <a:pPr/>
-              <a:t>28-05-2013</a:t>
+              <a:t>29/05/13</a:t>
             </a:fld>
             <a:endParaRPr lang="da-DK"/>
           </a:p>
@@ -3285,7 +3290,7 @@
             <a:fld id="{F95D7CF2-08BE-4584-88A3-02DBA3238833}" type="datetimeFigureOut">
               <a:rPr lang="da-DK" smtClean="0"/>
               <a:pPr/>
-              <a:t>28-05-2013</a:t>
+              <a:t>29/05/13</a:t>
             </a:fld>
             <a:endParaRPr lang="da-DK"/>
           </a:p>
@@ -3672,7 +3677,7 @@
             <a:fld id="{F95D7CF2-08BE-4584-88A3-02DBA3238833}" type="datetimeFigureOut">
               <a:rPr lang="da-DK" smtClean="0"/>
               <a:pPr/>
-              <a:t>28-05-2013</a:t>
+              <a:t>29/05/13</a:t>
             </a:fld>
             <a:endParaRPr lang="da-DK"/>
           </a:p>
@@ -3795,7 +3800,7 @@
             <a:fld id="{F95D7CF2-08BE-4584-88A3-02DBA3238833}" type="datetimeFigureOut">
               <a:rPr lang="da-DK" smtClean="0"/>
               <a:pPr/>
-              <a:t>28-05-2013</a:t>
+              <a:t>29/05/13</a:t>
             </a:fld>
             <a:endParaRPr lang="da-DK"/>
           </a:p>
@@ -3977,7 +3982,7 @@
             <a:fld id="{F95D7CF2-08BE-4584-88A3-02DBA3238833}" type="datetimeFigureOut">
               <a:rPr lang="da-DK" smtClean="0"/>
               <a:pPr/>
-              <a:t>28-05-2013</a:t>
+              <a:t>29/05/13</a:t>
             </a:fld>
             <a:endParaRPr lang="da-DK"/>
           </a:p>
@@ -4313,7 +4318,7 @@
             <a:fld id="{F95D7CF2-08BE-4584-88A3-02DBA3238833}" type="datetimeFigureOut">
               <a:rPr lang="da-DK" smtClean="0"/>
               <a:pPr/>
-              <a:t>28-05-2013</a:t>
+              <a:t>29/05/13</a:t>
             </a:fld>
             <a:endParaRPr lang="da-DK"/>
           </a:p>
@@ -4684,7 +4689,7 @@
             <a:fld id="{F95D7CF2-08BE-4584-88A3-02DBA3238833}" type="datetimeFigureOut">
               <a:rPr lang="da-DK" smtClean="0"/>
               <a:pPr/>
-              <a:t>28-05-2013</a:t>
+              <a:t>29/05/13</a:t>
             </a:fld>
             <a:endParaRPr lang="da-DK"/>
           </a:p>
@@ -5104,7 +5109,7 @@
             <a:fld id="{F95D7CF2-08BE-4584-88A3-02DBA3238833}" type="datetimeFigureOut">
               <a:rPr lang="da-DK" smtClean="0"/>
               <a:pPr/>
-              <a:t>28-05-2013</a:t>
+              <a:t>29/05/13</a:t>
             </a:fld>
             <a:endParaRPr lang="da-DK"/>
           </a:p>
@@ -5653,7 +5658,7 @@
                   <a:srgbClr val="C00000"/>
                 </a:solidFill>
               </a:rPr>
-              <a:t>Middleware</a:t>
+              <a:t>Enheder i DDS / DCPS</a:t>
             </a:r>
             <a:endParaRPr lang="da-DK" dirty="0">
               <a:solidFill>
@@ -5663,99 +5668,29 @@
           </a:p>
         </p:txBody>
       </p:sp>
-      <p:sp>
-        <p:nvSpPr>
-          <p:cNvPr id="3" name="Content Placeholder 2"/>
-          <p:cNvSpPr>
-            <a:spLocks noGrp="1"/>
-          </p:cNvSpPr>
+      <p:pic>
+        <p:nvPicPr>
+          <p:cNvPr id="4" name="Content Placeholder 3" descr="DDSentities.png"/>
+          <p:cNvPicPr>
+            <a:picLocks noGrp="1" noChangeAspect="1"/>
+          </p:cNvPicPr>
           <p:nvPr>
             <p:ph sz="half" idx="1"/>
           </p:nvPr>
-        </p:nvSpPr>
+        </p:nvPicPr>
+        <p:blipFill>
+          <a:blip r:embed="rId3" cstate="print"/>
+          <a:stretch>
+            <a:fillRect/>
+          </a:stretch>
+        </p:blipFill>
         <p:spPr>
           <a:xfrm>
-            <a:off x="514352" y="530352"/>
-            <a:ext cx="8090096" cy="4389120"/>
+            <a:off x="683568" y="1124744"/>
+            <a:ext cx="7537928" cy="3384376"/>
           </a:xfrm>
         </p:spPr>
-        <p:txBody>
-          <a:bodyPr>
-            <a:normAutofit/>
-          </a:bodyPr>
-          <a:lstStyle/>
-          <a:p>
-            <a:pPr>
-              <a:buClr>
-                <a:srgbClr val="C00000"/>
-              </a:buClr>
-            </a:pPr>
-            <a:r>
-              <a:rPr lang="da-DK" dirty="0" smtClean="0"/>
-              <a:t>Fordele</a:t>
-            </a:r>
-          </a:p>
-          <a:p>
-            <a:pPr lvl="1">
-              <a:buClr>
-                <a:srgbClr val="C00000"/>
-              </a:buClr>
-            </a:pPr>
-            <a:r>
-              <a:rPr lang="da-DK" dirty="0" smtClean="0"/>
-              <a:t>Store og komplekse systemer tilbydes en kommunikations-kanal</a:t>
-            </a:r>
-          </a:p>
-          <a:p>
-            <a:pPr lvl="1">
-              <a:buClr>
-                <a:srgbClr val="C00000"/>
-              </a:buClr>
-            </a:pPr>
-            <a:r>
-              <a:rPr lang="da-DK" dirty="0" smtClean="0"/>
-              <a:t>Nogle middleware implementerer bestemte standarder målrettet forskellige industrier/kategorier</a:t>
-            </a:r>
-          </a:p>
-          <a:p>
-            <a:pPr>
-              <a:buClr>
-                <a:srgbClr val="C00000"/>
-              </a:buClr>
-            </a:pPr>
-            <a:r>
-              <a:rPr lang="da-DK" dirty="0" smtClean="0"/>
-              <a:t>Ulemper</a:t>
-            </a:r>
-          </a:p>
-          <a:p>
-            <a:pPr lvl="1">
-              <a:buClr>
-                <a:srgbClr val="C00000"/>
-              </a:buClr>
-            </a:pPr>
-            <a:r>
-              <a:rPr lang="da-DK" dirty="0" smtClean="0"/>
-              <a:t>Kan være ressourcekrævende </a:t>
-            </a:r>
-            <a:r>
-              <a:rPr lang="da-DK" dirty="0" smtClean="0">
-                <a:sym typeface="Wingdings" pitchFamily="2" charset="2"/>
-              </a:rPr>
-              <a:t> benyttes ikke hvis man har et lille distribueret system, som er nemt at overskue</a:t>
-            </a:r>
-            <a:endParaRPr lang="da-DK" dirty="0" smtClean="0"/>
-          </a:p>
-          <a:p>
-            <a:pPr lvl="1">
-              <a:buClr>
-                <a:srgbClr val="C00000"/>
-              </a:buClr>
-            </a:pPr>
-            <a:endParaRPr lang="da-DK" dirty="0"/>
-          </a:p>
-        </p:txBody>
-      </p:sp>
+      </p:pic>
     </p:spTree>
   </p:cSld>
   <p:clrMapOvr>
@@ -5883,7 +5818,6 @@
               <a:rPr lang="da-DK" dirty="0" smtClean="0"/>
               <a:t>Afkobling</a:t>
             </a:r>
-            <a:endParaRPr lang="da-DK" dirty="0" smtClean="0"/>
           </a:p>
           <a:p>
             <a:pPr marL="265176" lvl="1" indent="-265176">
@@ -6556,7 +6490,6 @@
               <a:rPr lang="da-DK" dirty="0" smtClean="0"/>
               <a:t>Middleware</a:t>
             </a:r>
-            <a:endParaRPr lang="da-DK" dirty="0" smtClean="0"/>
           </a:p>
           <a:p>
             <a:pPr marL="502920" lvl="2" indent="-265176">
@@ -6572,11 +6505,7 @@
             </a:pPr>
             <a:r>
               <a:rPr lang="da-DK" dirty="0" smtClean="0"/>
-              <a:t>Kommunikations </a:t>
-            </a:r>
-            <a:r>
-              <a:rPr lang="da-DK" dirty="0" smtClean="0"/>
-              <a:t>paradigmer</a:t>
+              <a:t>Kommunikations paradigmer</a:t>
             </a:r>
           </a:p>
           <a:p>
@@ -6595,7 +6524,6 @@
               <a:rPr lang="da-DK" dirty="0" smtClean="0"/>
               <a:t>Afkobling</a:t>
             </a:r>
-            <a:endParaRPr lang="da-DK" dirty="0" smtClean="0"/>
           </a:p>
           <a:p>
             <a:pPr marL="265176" lvl="1" indent="-265176">
@@ -6780,8 +6708,13 @@
             </a:pPr>
             <a:r>
               <a:rPr lang="da-DK" dirty="0" smtClean="0"/>
-              <a:t>Letter kommunikation mellem forskellig hardware med forskellig operativsystem</a:t>
-            </a:r>
+              <a:t>Letter </a:t>
+            </a:r>
+            <a:r>
+              <a:rPr lang="da-DK" dirty="0" smtClean="0"/>
+              <a:t>kommunikation i et distribueret system</a:t>
+            </a:r>
+            <a:endParaRPr lang="da-DK" dirty="0" smtClean="0"/>
           </a:p>
           <a:p>
             <a:pPr lvl="1">
@@ -7127,6 +7060,155 @@
                   <a:srgbClr val="C00000"/>
                 </a:solidFill>
               </a:rPr>
+              <a:t>Middleware</a:t>
+            </a:r>
+            <a:endParaRPr lang="da-DK" dirty="0">
+              <a:solidFill>
+                <a:srgbClr val="C00000"/>
+              </a:solidFill>
+            </a:endParaRPr>
+          </a:p>
+        </p:txBody>
+      </p:sp>
+      <p:sp>
+        <p:nvSpPr>
+          <p:cNvPr id="3" name="Content Placeholder 2"/>
+          <p:cNvSpPr>
+            <a:spLocks noGrp="1"/>
+          </p:cNvSpPr>
+          <p:nvPr>
+            <p:ph sz="half" idx="1"/>
+          </p:nvPr>
+        </p:nvSpPr>
+        <p:spPr>
+          <a:xfrm>
+            <a:off x="514352" y="530352"/>
+            <a:ext cx="8090096" cy="4389120"/>
+          </a:xfrm>
+        </p:spPr>
+        <p:txBody>
+          <a:bodyPr>
+            <a:normAutofit/>
+          </a:bodyPr>
+          <a:lstStyle/>
+          <a:p>
+            <a:pPr>
+              <a:buClr>
+                <a:srgbClr val="C00000"/>
+              </a:buClr>
+            </a:pPr>
+            <a:r>
+              <a:rPr lang="da-DK" dirty="0" smtClean="0"/>
+              <a:t>Fordele</a:t>
+            </a:r>
+          </a:p>
+          <a:p>
+            <a:pPr lvl="1">
+              <a:buClr>
+                <a:srgbClr val="C00000"/>
+              </a:buClr>
+            </a:pPr>
+            <a:r>
+              <a:rPr lang="da-DK" dirty="0" smtClean="0"/>
+              <a:t>Store og komplekse systemer tilbydes en kommunikations-kanal</a:t>
+            </a:r>
+          </a:p>
+          <a:p>
+            <a:pPr lvl="1">
+              <a:buClr>
+                <a:srgbClr val="C00000"/>
+              </a:buClr>
+            </a:pPr>
+            <a:r>
+              <a:rPr lang="da-DK" dirty="0" smtClean="0"/>
+              <a:t>Nogle middleware implementerer bestemte standarder målrettet forskellige industrier/kategorier</a:t>
+            </a:r>
+          </a:p>
+          <a:p>
+            <a:pPr>
+              <a:buClr>
+                <a:srgbClr val="C00000"/>
+              </a:buClr>
+            </a:pPr>
+            <a:r>
+              <a:rPr lang="da-DK" dirty="0" smtClean="0"/>
+              <a:t>Ulemper</a:t>
+            </a:r>
+          </a:p>
+          <a:p>
+            <a:pPr lvl="1">
+              <a:buClr>
+                <a:srgbClr val="C00000"/>
+              </a:buClr>
+            </a:pPr>
+            <a:r>
+              <a:rPr lang="da-DK" dirty="0" smtClean="0"/>
+              <a:t>Kan være ressourcekrævende </a:t>
+            </a:r>
+            <a:r>
+              <a:rPr lang="da-DK" dirty="0" smtClean="0">
+                <a:sym typeface="Wingdings" pitchFamily="2" charset="2"/>
+              </a:rPr>
+              <a:t> benyttes ikke hvis man har et lille distribueret system, som er nemt at overskue</a:t>
+            </a:r>
+            <a:endParaRPr lang="da-DK" dirty="0" smtClean="0"/>
+          </a:p>
+          <a:p>
+            <a:pPr lvl="1">
+              <a:buClr>
+                <a:srgbClr val="C00000"/>
+              </a:buClr>
+            </a:pPr>
+            <a:endParaRPr lang="da-DK" dirty="0"/>
+          </a:p>
+        </p:txBody>
+      </p:sp>
+    </p:spTree>
+  </p:cSld>
+  <p:clrMapOvr>
+    <a:masterClrMapping/>
+  </p:clrMapOvr>
+</p:sld>
+</file>
+
+<file path=ppt/slides/slide7.xml><?xml version="1.0" encoding="utf-8"?>
+<p:sld xmlns:a="http://schemas.openxmlformats.org/drawingml/2006/main" xmlns:r="http://schemas.openxmlformats.org/officeDocument/2006/relationships" xmlns:p="http://schemas.openxmlformats.org/presentationml/2006/main">
+  <p:cSld>
+    <p:spTree>
+      <p:nvGrpSpPr>
+        <p:cNvPr id="1" name=""/>
+        <p:cNvGrpSpPr/>
+        <p:nvPr/>
+      </p:nvGrpSpPr>
+      <p:grpSpPr>
+        <a:xfrm>
+          <a:off x="0" y="0"/>
+          <a:ext cx="0" cy="0"/>
+          <a:chOff x="0" y="0"/>
+          <a:chExt cx="0" cy="0"/>
+        </a:xfrm>
+      </p:grpSpPr>
+      <p:sp>
+        <p:nvSpPr>
+          <p:cNvPr id="2" name="Title 1"/>
+          <p:cNvSpPr>
+            <a:spLocks noGrp="1"/>
+          </p:cNvSpPr>
+          <p:nvPr>
+            <p:ph type="title"/>
+          </p:nvPr>
+        </p:nvSpPr>
+        <p:spPr/>
+        <p:txBody>
+          <a:bodyPr/>
+          <a:lstStyle/>
+          <a:p>
+            <a:r>
+              <a:rPr lang="da-DK" dirty="0" smtClean="0">
+                <a:solidFill>
+                  <a:srgbClr val="C00000"/>
+                </a:solidFill>
+              </a:rPr>
               <a:t>Outline</a:t>
             </a:r>
             <a:endParaRPr lang="da-DK" dirty="0">
@@ -7208,7 +7290,6 @@
               <a:rPr lang="da-DK" dirty="0" smtClean="0"/>
               <a:t>Afkobling</a:t>
             </a:r>
-            <a:endParaRPr lang="da-DK" dirty="0" smtClean="0"/>
           </a:p>
           <a:p>
             <a:pPr marL="265176" lvl="1" indent="-265176">
@@ -7318,7 +7399,7 @@
 </p:sld>
 </file>
 
-<file path=ppt/slides/slide7.xml><?xml version="1.0" encoding="utf-8"?>
+<file path=ppt/slides/slide8.xml><?xml version="1.0" encoding="utf-8"?>
 <p:sld xmlns:a="http://schemas.openxmlformats.org/drawingml/2006/main" xmlns:r="http://schemas.openxmlformats.org/officeDocument/2006/relationships" xmlns:p="http://schemas.openxmlformats.org/presentationml/2006/main">
   <p:cSld>
     <p:spTree>
@@ -7506,222 +7587,6 @@
 </p:sld>
 </file>
 
-<file path=ppt/slides/slide8.xml><?xml version="1.0" encoding="utf-8"?>
-<p:sld xmlns:a="http://schemas.openxmlformats.org/drawingml/2006/main" xmlns:r="http://schemas.openxmlformats.org/officeDocument/2006/relationships" xmlns:p="http://schemas.openxmlformats.org/presentationml/2006/main">
-  <p:cSld>
-    <p:spTree>
-      <p:nvGrpSpPr>
-        <p:cNvPr id="1" name=""/>
-        <p:cNvGrpSpPr/>
-        <p:nvPr/>
-      </p:nvGrpSpPr>
-      <p:grpSpPr>
-        <a:xfrm>
-          <a:off x="0" y="0"/>
-          <a:ext cx="0" cy="0"/>
-          <a:chOff x="0" y="0"/>
-          <a:chExt cx="0" cy="0"/>
-        </a:xfrm>
-      </p:grpSpPr>
-      <p:sp>
-        <p:nvSpPr>
-          <p:cNvPr id="2" name="Title 1"/>
-          <p:cNvSpPr>
-            <a:spLocks noGrp="1"/>
-          </p:cNvSpPr>
-          <p:nvPr>
-            <p:ph type="title"/>
-          </p:nvPr>
-        </p:nvSpPr>
-        <p:spPr/>
-        <p:txBody>
-          <a:bodyPr/>
-          <a:lstStyle/>
-          <a:p>
-            <a:r>
-              <a:rPr lang="da-DK" dirty="0" smtClean="0">
-                <a:solidFill>
-                  <a:srgbClr val="C00000"/>
-                </a:solidFill>
-              </a:rPr>
-              <a:t>Enheder i DDS</a:t>
-            </a:r>
-            <a:endParaRPr lang="da-DK" dirty="0">
-              <a:solidFill>
-                <a:srgbClr val="C00000"/>
-              </a:solidFill>
-            </a:endParaRPr>
-          </a:p>
-        </p:txBody>
-      </p:sp>
-      <p:sp>
-        <p:nvSpPr>
-          <p:cNvPr id="3" name="Content Placeholder 2"/>
-          <p:cNvSpPr>
-            <a:spLocks noGrp="1"/>
-          </p:cNvSpPr>
-          <p:nvPr>
-            <p:ph sz="half" idx="1"/>
-          </p:nvPr>
-        </p:nvSpPr>
-        <p:spPr>
-          <a:xfrm>
-            <a:off x="514352" y="530352"/>
-            <a:ext cx="7081984" cy="4482824"/>
-          </a:xfrm>
-        </p:spPr>
-        <p:txBody>
-          <a:bodyPr>
-            <a:normAutofit lnSpcReduction="10000"/>
-          </a:bodyPr>
-          <a:lstStyle/>
-          <a:p>
-            <a:pPr>
-              <a:lnSpc>
-                <a:spcPct val="150000"/>
-              </a:lnSpc>
-              <a:buClr>
-                <a:srgbClr val="C00000"/>
-              </a:buClr>
-            </a:pPr>
-            <a:r>
-              <a:rPr lang="en-US" dirty="0" smtClean="0"/>
-              <a:t>Data Logical Reconstruction Layer (DLRL)</a:t>
-            </a:r>
-          </a:p>
-          <a:p>
-            <a:pPr lvl="1">
-              <a:lnSpc>
-                <a:spcPct val="150000"/>
-              </a:lnSpc>
-              <a:buClr>
-                <a:srgbClr val="C00000"/>
-              </a:buClr>
-            </a:pPr>
-            <a:r>
-              <a:rPr lang="en-US" dirty="0" err="1" smtClean="0"/>
-              <a:t>Simpel</a:t>
-            </a:r>
-            <a:r>
-              <a:rPr lang="en-US" dirty="0" smtClean="0"/>
-              <a:t> integration </a:t>
-            </a:r>
-            <a:r>
-              <a:rPr lang="en-US" dirty="0" err="1" smtClean="0"/>
-              <a:t>mellem</a:t>
-            </a:r>
-            <a:r>
-              <a:rPr lang="en-US" dirty="0" smtClean="0"/>
-              <a:t> DDS </a:t>
-            </a:r>
-            <a:r>
-              <a:rPr lang="en-US" dirty="0" err="1" smtClean="0"/>
-              <a:t>og</a:t>
-            </a:r>
-            <a:r>
-              <a:rPr lang="en-US" dirty="0" smtClean="0"/>
-              <a:t> </a:t>
-            </a:r>
-            <a:r>
-              <a:rPr lang="en-US" dirty="0" err="1" smtClean="0"/>
-              <a:t>applikationen</a:t>
-            </a:r>
-            <a:endParaRPr lang="en-US" dirty="0" smtClean="0"/>
-          </a:p>
-          <a:p>
-            <a:pPr>
-              <a:lnSpc>
-                <a:spcPct val="150000"/>
-              </a:lnSpc>
-              <a:buClr>
-                <a:srgbClr val="C00000"/>
-              </a:buClr>
-            </a:pPr>
-            <a:r>
-              <a:rPr lang="en-US" dirty="0" smtClean="0"/>
-              <a:t>Data-Centric Publish-Subscribe (DCPS)</a:t>
-            </a:r>
-          </a:p>
-          <a:p>
-            <a:pPr lvl="1">
-              <a:lnSpc>
-                <a:spcPct val="150000"/>
-              </a:lnSpc>
-              <a:buClr>
-                <a:srgbClr val="C00000"/>
-              </a:buClr>
-            </a:pPr>
-            <a:r>
-              <a:rPr lang="en-US" dirty="0" err="1" smtClean="0"/>
-              <a:t>Sørger</a:t>
-            </a:r>
-            <a:r>
-              <a:rPr lang="en-US" dirty="0" smtClean="0"/>
-              <a:t> for, at data </a:t>
-            </a:r>
-            <a:r>
-              <a:rPr lang="en-US" dirty="0" err="1" smtClean="0"/>
-              <a:t>kan</a:t>
-            </a:r>
-            <a:r>
-              <a:rPr lang="en-US" dirty="0" smtClean="0"/>
-              <a:t> </a:t>
-            </a:r>
-            <a:r>
-              <a:rPr lang="en-US" dirty="0" err="1" smtClean="0"/>
-              <a:t>hentes</a:t>
-            </a:r>
-            <a:r>
-              <a:rPr lang="en-US" dirty="0" smtClean="0"/>
-              <a:t> </a:t>
-            </a:r>
-            <a:r>
-              <a:rPr lang="en-US" dirty="0" err="1" smtClean="0"/>
-              <a:t>af</a:t>
-            </a:r>
-            <a:r>
-              <a:rPr lang="en-US" dirty="0" smtClean="0"/>
-              <a:t> de </a:t>
-            </a:r>
-            <a:r>
-              <a:rPr lang="en-US" dirty="0" err="1" smtClean="0"/>
-              <a:t>korrekte</a:t>
-            </a:r>
-            <a:r>
-              <a:rPr lang="en-US" dirty="0" smtClean="0"/>
-              <a:t> </a:t>
-            </a:r>
-            <a:r>
-              <a:rPr lang="en-US" dirty="0" err="1" smtClean="0"/>
-              <a:t>modtagere</a:t>
-            </a:r>
-            <a:endParaRPr lang="en-US" dirty="0" smtClean="0"/>
-          </a:p>
-          <a:p>
-            <a:pPr lvl="1">
-              <a:lnSpc>
-                <a:spcPct val="150000"/>
-              </a:lnSpc>
-              <a:buClr>
-                <a:srgbClr val="C00000"/>
-              </a:buClr>
-            </a:pPr>
-            <a:r>
-              <a:rPr lang="en-US" dirty="0" err="1" smtClean="0"/>
-              <a:t>Obligatorisk</a:t>
-            </a:r>
-            <a:endParaRPr lang="da-DK" dirty="0"/>
-          </a:p>
-        </p:txBody>
-      </p:sp>
-    </p:spTree>
-  </p:cSld>
-  <p:clrMapOvr>
-    <a:masterClrMapping/>
-  </p:clrMapOvr>
-</p:sld>
-</file>
-
 <file path=ppt/slides/slide9.xml><?xml version="1.0" encoding="utf-8"?>
 <p:sld xmlns:a="http://schemas.openxmlformats.org/drawingml/2006/main" xmlns:r="http://schemas.openxmlformats.org/officeDocument/2006/relationships" xmlns:p="http://schemas.openxmlformats.org/presentationml/2006/main">
   <p:cSld>
@@ -7760,7 +7625,7 @@
                   <a:srgbClr val="C00000"/>
                 </a:solidFill>
               </a:rPr>
-              <a:t>Enheder i DDS / DCPS</a:t>
+              <a:t>Enheder i DDS</a:t>
             </a:r>
             <a:endParaRPr lang="da-DK" dirty="0">
               <a:solidFill>
@@ -7770,29 +7635,166 @@
           </a:p>
         </p:txBody>
       </p:sp>
-      <p:pic>
-        <p:nvPicPr>
-          <p:cNvPr id="4" name="Content Placeholder 3" descr="DDSentities.png"/>
-          <p:cNvPicPr>
-            <a:picLocks noGrp="1" noChangeAspect="1"/>
-          </p:cNvPicPr>
+      <p:sp>
+        <p:nvSpPr>
+          <p:cNvPr id="3" name="Content Placeholder 2"/>
+          <p:cNvSpPr>
+            <a:spLocks noGrp="1"/>
+          </p:cNvSpPr>
           <p:nvPr>
             <p:ph sz="half" idx="1"/>
           </p:nvPr>
-        </p:nvPicPr>
-        <p:blipFill>
-          <a:blip r:embed="rId3" cstate="print"/>
-          <a:stretch>
-            <a:fillRect/>
-          </a:stretch>
-        </p:blipFill>
+        </p:nvSpPr>
         <p:spPr>
           <a:xfrm>
-            <a:off x="683568" y="1124744"/>
-            <a:ext cx="7537928" cy="3384376"/>
+            <a:off x="514352" y="530352"/>
+            <a:ext cx="7081984" cy="4482824"/>
           </a:xfrm>
         </p:spPr>
-      </p:pic>
+        <p:txBody>
+          <a:bodyPr>
+            <a:normAutofit lnSpcReduction="10000"/>
+          </a:bodyPr>
+          <a:lstStyle/>
+          <a:p>
+            <a:pPr>
+              <a:lnSpc>
+                <a:spcPct val="150000"/>
+              </a:lnSpc>
+              <a:buClr>
+                <a:srgbClr val="C00000"/>
+              </a:buClr>
+            </a:pPr>
+            <a:r>
+              <a:rPr lang="en-US" dirty="0" smtClean="0"/>
+              <a:t>Data Logical Reconstruction Layer (DLRL)</a:t>
+            </a:r>
+          </a:p>
+          <a:p>
+            <a:pPr lvl="1">
+              <a:lnSpc>
+                <a:spcPct val="150000"/>
+              </a:lnSpc>
+              <a:buClr>
+                <a:srgbClr val="C00000"/>
+              </a:buClr>
+            </a:pPr>
+            <a:r>
+              <a:rPr lang="en-US" dirty="0" err="1" smtClean="0"/>
+              <a:t>Simpel</a:t>
+            </a:r>
+            <a:r>
+              <a:rPr lang="en-US" dirty="0" smtClean="0"/>
+              <a:t> integration </a:t>
+            </a:r>
+            <a:r>
+              <a:rPr lang="en-US" dirty="0" err="1" smtClean="0"/>
+              <a:t>mellem</a:t>
+            </a:r>
+            <a:r>
+              <a:rPr lang="en-US" dirty="0" smtClean="0"/>
+              <a:t> DDS </a:t>
+            </a:r>
+            <a:r>
+              <a:rPr lang="en-US" dirty="0" err="1" smtClean="0"/>
+              <a:t>og</a:t>
+            </a:r>
+            <a:r>
+              <a:rPr lang="en-US" dirty="0" smtClean="0"/>
+              <a:t> </a:t>
+            </a:r>
+            <a:r>
+              <a:rPr lang="en-US" dirty="0" err="1" smtClean="0"/>
+              <a:t>applikationen</a:t>
+            </a:r>
+            <a:endParaRPr lang="en-US" dirty="0" smtClean="0"/>
+          </a:p>
+          <a:p>
+            <a:pPr>
+              <a:lnSpc>
+                <a:spcPct val="150000"/>
+              </a:lnSpc>
+              <a:buClr>
+                <a:srgbClr val="C00000"/>
+              </a:buClr>
+            </a:pPr>
+            <a:r>
+              <a:rPr lang="en-US" dirty="0" smtClean="0"/>
+              <a:t>Data-Centric Publish-Subscribe (DCPS)</a:t>
+            </a:r>
+          </a:p>
+          <a:p>
+            <a:pPr lvl="1">
+              <a:lnSpc>
+                <a:spcPct val="150000"/>
+              </a:lnSpc>
+              <a:buClr>
+                <a:srgbClr val="C00000"/>
+              </a:buClr>
+            </a:pPr>
+            <a:r>
+              <a:rPr lang="en-US" dirty="0" err="1" smtClean="0"/>
+              <a:t>Sørger</a:t>
+            </a:r>
+            <a:r>
+              <a:rPr lang="en-US" dirty="0" smtClean="0"/>
+              <a:t> for, at data </a:t>
+            </a:r>
+            <a:r>
+              <a:rPr lang="en-US" dirty="0" err="1" smtClean="0"/>
+              <a:t>kan</a:t>
+            </a:r>
+            <a:r>
+              <a:rPr lang="en-US" dirty="0" smtClean="0"/>
+              <a:t> </a:t>
+            </a:r>
+            <a:r>
+              <a:rPr lang="en-US" dirty="0" err="1" smtClean="0"/>
+              <a:t>hentes</a:t>
+            </a:r>
+            <a:r>
+              <a:rPr lang="en-US" dirty="0" smtClean="0"/>
+              <a:t> </a:t>
+            </a:r>
+            <a:r>
+              <a:rPr lang="en-US" dirty="0" err="1" smtClean="0"/>
+              <a:t>af</a:t>
+            </a:r>
+            <a:r>
+              <a:rPr lang="en-US" dirty="0" smtClean="0"/>
+              <a:t> de </a:t>
+            </a:r>
+            <a:r>
+              <a:rPr lang="en-US" dirty="0" err="1" smtClean="0"/>
+              <a:t>korrekte</a:t>
+            </a:r>
+            <a:r>
+              <a:rPr lang="en-US" dirty="0" smtClean="0"/>
+              <a:t> </a:t>
+            </a:r>
+            <a:r>
+              <a:rPr lang="en-US" dirty="0" err="1" smtClean="0"/>
+              <a:t>modtagere</a:t>
+            </a:r>
+            <a:endParaRPr lang="en-US" dirty="0" smtClean="0"/>
+          </a:p>
+          <a:p>
+            <a:pPr lvl="1">
+              <a:lnSpc>
+                <a:spcPct val="150000"/>
+              </a:lnSpc>
+              <a:buClr>
+                <a:srgbClr val="C00000"/>
+              </a:buClr>
+            </a:pPr>
+            <a:r>
+              <a:rPr lang="en-US" dirty="0" err="1" smtClean="0"/>
+              <a:t>Obligatorisk</a:t>
+            </a:r>
+            <a:endParaRPr lang="da-DK" dirty="0"/>
+          </a:p>
+        </p:txBody>
+      </p:sp>
     </p:spTree>
   </p:cSld>
   <p:clrMapOvr>

</xml_diff>